<commit_message>
update result section in slide
</commit_message>
<xml_diff>
--- a/slide.pptx
+++ b/slide.pptx
@@ -3184,28 +3184,60 @@
           <a:lstStyle/>
           <a:p>
             <a:r>
-              <a:rPr lang="vi-VN"/>
+              <a:rPr lang="vi-VN" dirty="0"/>
               <a:t>Dữ liệu được thu thập từ </a:t>
             </a:r>
             <a:r>
-              <a:rPr lang="vi-VN" i="1">
+              <a:rPr lang="vi-VN" i="1" dirty="0">
                 <a:hlinkClick r:id="rId2"/>
               </a:rPr>
               <a:t>therecipecritic.com</a:t>
             </a:r>
             <a:r>
-              <a:rPr lang="vi-VN" i="1"/>
+              <a:rPr lang="vi-VN" i="1" dirty="0"/>
               <a:t> </a:t>
             </a:r>
             <a:r>
-              <a:rPr lang="vi-VN"/>
-              <a:t>sử dụng Selenium với driver Chrome.</a:t>
-            </a:r>
-          </a:p>
-          <a:p>
-            <a:r>
-              <a:rPr lang="vi-VN"/>
-              <a:t>Gồm 2 giai đoạn chính:</a:t>
+              <a:rPr lang="vi-VN" dirty="0"/>
+              <a:t>sử dụng </a:t>
+            </a:r>
+            <a:r>
+              <a:rPr lang="vi-VN" dirty="0" err="1"/>
+              <a:t>Selenium</a:t>
+            </a:r>
+            <a:r>
+              <a:rPr lang="vi-VN" dirty="0"/>
+              <a:t> với </a:t>
+            </a:r>
+            <a:r>
+              <a:rPr lang="vi-VN" dirty="0" err="1"/>
+              <a:t>driver</a:t>
+            </a:r>
+            <a:r>
+              <a:rPr lang="vi-VN" dirty="0"/>
+              <a:t> </a:t>
+            </a:r>
+            <a:r>
+              <a:rPr lang="vi-VN" dirty="0" err="1"/>
+              <a:t>Chrome</a:t>
+            </a:r>
+            <a:r>
+              <a:rPr lang="vi-VN" dirty="0"/>
+              <a:t>.</a:t>
+            </a:r>
+          </a:p>
+          <a:p>
+            <a:r>
+              <a:rPr lang="vi-VN" dirty="0"/>
+              <a:t>Gồm </a:t>
+            </a:r>
+            <a:r>
+              <a:rPr lang="en-US" dirty="0"/>
+              <a:t>3</a:t>
+            </a:r>
+            <a:r>
+              <a:rPr lang="vi-VN" dirty="0"/>
+              <a:t> giai đoạn chính:</a:t>
             </a:r>
           </a:p>
           <a:p>
@@ -3214,7 +3246,7 @@
               <a:buAutoNum type="arabicPeriod"/>
             </a:pPr>
             <a:r>
-              <a:rPr lang="vi-VN"/>
+              <a:rPr lang="vi-VN" dirty="0"/>
               <a:t>Thu thập đường dẫn danh mục</a:t>
             </a:r>
           </a:p>
@@ -3224,9 +3256,77 @@
               <a:buAutoNum type="arabicPeriod"/>
             </a:pPr>
             <a:r>
-              <a:rPr lang="vi-VN"/>
-              <a:t>Thu thập đường dẫn chi tiết của từng công thức.</a:t>
-            </a:r>
+              <a:rPr lang="vi-VN" dirty="0"/>
+              <a:t>Thu thập đường dẫn của từng công thức.</a:t>
+            </a:r>
+            <a:endParaRPr lang="en-US" dirty="0"/>
+          </a:p>
+          <a:p>
+            <a:pPr marL="914400" lvl="1" indent="-457200">
+              <a:buFont typeface="+mj-lt"/>
+              <a:buAutoNum type="arabicPeriod"/>
+            </a:pPr>
+            <a:r>
+              <a:rPr lang="en-US" dirty="0"/>
+              <a:t>Thu </a:t>
+            </a:r>
+            <a:r>
+              <a:rPr lang="en-US" dirty="0" err="1"/>
+              <a:t>thập</a:t>
+            </a:r>
+            <a:r>
+              <a:rPr lang="en-US" dirty="0"/>
+              <a:t> </a:t>
+            </a:r>
+            <a:r>
+              <a:rPr lang="en-US" dirty="0" err="1"/>
+              <a:t>công</a:t>
+            </a:r>
+            <a:r>
+              <a:rPr lang="en-US" dirty="0"/>
+              <a:t> </a:t>
+            </a:r>
+            <a:r>
+              <a:rPr lang="en-US" dirty="0" err="1"/>
+              <a:t>thức</a:t>
+            </a:r>
+            <a:r>
+              <a:rPr lang="en-US" dirty="0"/>
+              <a:t> chi </a:t>
+            </a:r>
+            <a:r>
+              <a:rPr lang="en-US" dirty="0" err="1"/>
+              <a:t>tiết</a:t>
+            </a:r>
+            <a:r>
+              <a:rPr lang="en-US" dirty="0"/>
+              <a:t> của </a:t>
+            </a:r>
+            <a:r>
+              <a:rPr lang="en-US" dirty="0" err="1"/>
+              <a:t>từng</a:t>
+            </a:r>
+            <a:r>
+              <a:rPr lang="en-US" dirty="0"/>
+              <a:t> </a:t>
+            </a:r>
+            <a:r>
+              <a:rPr lang="en-US" dirty="0" err="1"/>
+              <a:t>công</a:t>
+            </a:r>
+            <a:r>
+              <a:rPr lang="en-US" dirty="0"/>
+              <a:t> </a:t>
+            </a:r>
+            <a:r>
+              <a:rPr lang="en-US" dirty="0" err="1"/>
+              <a:t>thức</a:t>
+            </a:r>
+            <a:r>
+              <a:rPr lang="en-US" dirty="0"/>
+              <a:t>.</a:t>
+            </a:r>
+            <a:endParaRPr lang="vi-VN" dirty="0"/>
           </a:p>
         </p:txBody>
       </p:sp>
@@ -3477,6 +3577,49 @@
                                           <p:spTgt spid="3">
                                             <p:txEl>
                                               <p:pRg st="3" end="3"/>
+                                            </p:txEl>
+                                          </p:spTgt>
+                                        </p:tgtEl>
+                                      </p:cBhvr>
+                                    </p:animEffect>
+                                  </p:childTnLst>
+                                </p:cTn>
+                              </p:par>
+                              <p:par>
+                                <p:cTn id="18" presetID="10" presetClass="entr" presetSubtype="0" fill="hold" nodeType="withEffect">
+                                  <p:stCondLst>
+                                    <p:cond delay="0"/>
+                                  </p:stCondLst>
+                                  <p:childTnLst>
+                                    <p:set>
+                                      <p:cBhvr>
+                                        <p:cTn id="19" dur="1" fill="hold">
+                                          <p:stCondLst>
+                                            <p:cond delay="0"/>
+                                          </p:stCondLst>
+                                        </p:cTn>
+                                        <p:tgtEl>
+                                          <p:spTgt spid="3">
+                                            <p:txEl>
+                                              <p:pRg st="4" end="4"/>
+                                            </p:txEl>
+                                          </p:spTgt>
+                                        </p:tgtEl>
+                                        <p:attrNameLst>
+                                          <p:attrName>style.visibility</p:attrName>
+                                        </p:attrNameLst>
+                                      </p:cBhvr>
+                                      <p:to>
+                                        <p:strVal val="visible"/>
+                                      </p:to>
+                                    </p:set>
+                                    <p:animEffect transition="in" filter="fade">
+                                      <p:cBhvr>
+                                        <p:cTn id="20" dur="500"/>
+                                        <p:tgtEl>
+                                          <p:spTgt spid="3">
+                                            <p:txEl>
+                                              <p:pRg st="4" end="4"/>
                                             </p:txEl>
                                           </p:spTgt>
                                         </p:tgtEl>
@@ -5972,97 +6115,120 @@
           <a:lstStyle/>
           <a:p>
             <a:r>
-              <a:rPr lang="vi-VN" b="1"/>
+              <a:rPr lang="vi-VN" b="1" dirty="0"/>
               <a:t>Môn học:</a:t>
             </a:r>
             <a:r>
-              <a:rPr lang="vi-VN"/>
+              <a:rPr lang="vi-VN" dirty="0"/>
               <a:t> MAT1207E - Nhập môn Trí tuệ Nhân tạo</a:t>
             </a:r>
           </a:p>
           <a:p>
             <a:r>
-              <a:rPr lang="vi-VN" b="1"/>
+              <a:rPr lang="vi-VN" b="1" dirty="0"/>
               <a:t>Học kỳ:</a:t>
             </a:r>
             <a:r>
-              <a:rPr lang="vi-VN"/>
+              <a:rPr lang="vi-VN" dirty="0"/>
               <a:t> Học kỳ 1 - 2025-2026</a:t>
             </a:r>
           </a:p>
           <a:p>
             <a:r>
-              <a:rPr lang="vi-VN" b="1"/>
+              <a:rPr lang="vi-VN" b="1" dirty="0"/>
               <a:t>Trường:</a:t>
             </a:r>
             <a:r>
-              <a:rPr lang="vi-VN"/>
+              <a:rPr lang="vi-VN" dirty="0"/>
               <a:t> VNU-HUS (Đại học Quốc gia Hà Nội - Trường Đại học Khoa học Tự nhiên)</a:t>
             </a:r>
           </a:p>
           <a:p>
             <a:r>
-              <a:rPr lang="vi-VN" b="1"/>
+              <a:rPr lang="vi-VN" b="1" dirty="0"/>
               <a:t>Tiêu đề:</a:t>
             </a:r>
             <a:r>
-              <a:rPr lang="vi-VN"/>
-              <a:t> Chatbot ẩm thực</a:t>
-            </a:r>
-          </a:p>
-          <a:p>
-            <a:r>
-              <a:rPr lang="vi-VN" b="1"/>
+              <a:rPr lang="vi-VN" dirty="0"/>
+              <a:t> </a:t>
+            </a:r>
+            <a:r>
+              <a:rPr lang="vi-VN" dirty="0" err="1"/>
+              <a:t>Chatbot</a:t>
+            </a:r>
+            <a:r>
+              <a:rPr lang="vi-VN" dirty="0"/>
+              <a:t> ẩm thực</a:t>
+            </a:r>
+          </a:p>
+          <a:p>
+            <a:r>
+              <a:rPr lang="vi-VN" b="1" dirty="0"/>
               <a:t>Ngày nộp:</a:t>
             </a:r>
-            <a:endParaRPr lang="vi-VN"/>
-          </a:p>
-          <a:p>
-            <a:r>
-              <a:rPr lang="vi-VN" b="1"/>
+            <a:r>
+              <a:rPr lang="en-US" b="1" dirty="0"/>
+              <a:t> 30/11/2025</a:t>
+            </a:r>
+            <a:endParaRPr lang="vi-VN" dirty="0"/>
+          </a:p>
+          <a:p>
+            <a:r>
+              <a:rPr lang="vi-VN" b="1" dirty="0"/>
               <a:t>Báo cáo PDF:</a:t>
             </a:r>
             <a:r>
-              <a:rPr lang="vi-VN"/>
+              <a:rPr lang="vi-VN" dirty="0"/>
               <a:t> </a:t>
             </a:r>
             <a:r>
-              <a:rPr lang="vi-VN">
+              <a:rPr lang="vi-VN" dirty="0" err="1">
                 <a:hlinkClick r:id="rId2"/>
               </a:rPr>
               <a:t>Github</a:t>
             </a:r>
-            <a:endParaRPr lang="vi-VN"/>
-          </a:p>
-          <a:p>
-            <a:r>
-              <a:rPr lang="vi-VN" b="1"/>
-              <a:t>Slide thuyết trình:</a:t>
-            </a:r>
-            <a:r>
-              <a:rPr lang="vi-VN"/>
-              <a:t> [Liên kết tới slide thuyết trình trong kho lưu trữ này]</a:t>
-            </a:r>
-          </a:p>
-          <a:p>
-            <a:r>
-              <a:rPr lang="vi-VN" b="1"/>
-              <a:t>Kho lưu trữ:</a:t>
-            </a:r>
-            <a:r>
-              <a:rPr lang="vi-VN"/>
+            <a:endParaRPr lang="vi-VN" dirty="0"/>
+          </a:p>
+          <a:p>
+            <a:r>
+              <a:rPr lang="vi-VN" b="1" dirty="0" err="1"/>
+              <a:t>Slide</a:t>
+            </a:r>
+            <a:r>
+              <a:rPr lang="vi-VN" b="1" dirty="0"/>
+              <a:t> thuyết trình:</a:t>
+            </a:r>
+            <a:r>
+              <a:rPr lang="vi-VN" dirty="0"/>
               <a:t> </a:t>
             </a:r>
             <a:r>
-              <a:rPr lang="vi-VN">
+              <a:rPr lang="vi-VN" dirty="0" err="1">
                 <a:hlinkClick r:id="rId3"/>
               </a:rPr>
               <a:t>Github</a:t>
             </a:r>
-            <a:endParaRPr lang="vi-VN"/>
-          </a:p>
-          <a:p>
-            <a:endParaRPr lang="vi-VN"/>
+            <a:endParaRPr lang="en-US" dirty="0"/>
+          </a:p>
+          <a:p>
+            <a:r>
+              <a:rPr lang="vi-VN" b="1" dirty="0"/>
+              <a:t>Kho lưu trữ:</a:t>
+            </a:r>
+            <a:r>
+              <a:rPr lang="vi-VN" dirty="0"/>
+              <a:t> </a:t>
+            </a:r>
+            <a:r>
+              <a:rPr lang="vi-VN" dirty="0" err="1">
+                <a:hlinkClick r:id="rId4"/>
+              </a:rPr>
+              <a:t>Github</a:t>
+            </a:r>
+            <a:endParaRPr lang="vi-VN" dirty="0"/>
+          </a:p>
+          <a:p>
+            <a:endParaRPr lang="vi-VN" dirty="0"/>
           </a:p>
         </p:txBody>
       </p:sp>
@@ -9520,23 +9686,23 @@
           <a:lstStyle/>
           <a:p>
             <a:r>
-              <a:rPr lang="vi-VN" b="1"/>
+              <a:rPr lang="vi-VN" b="1" dirty="0"/>
               <a:t>Số phiên </a:t>
             </a:r>
             <a:r>
-              <a:rPr lang="vi-VN"/>
+              <a:rPr lang="vi-VN" dirty="0"/>
               <a:t>(</a:t>
             </a:r>
             <a:r>
-              <a:rPr lang="vi-VN" i="1"/>
+              <a:rPr lang="vi-VN" i="1" dirty="0" err="1"/>
               <a:t>sessions</a:t>
             </a:r>
             <a:r>
-              <a:rPr lang="vi-VN"/>
+              <a:rPr lang="vi-VN" dirty="0"/>
               <a:t>): 30 phiên với </a:t>
             </a:r>
             <a:r>
-              <a:rPr lang="vi-VN" b="1">
+              <a:rPr lang="vi-VN" b="1" dirty="0" err="1">
                 <a:solidFill>
                   <a:schemeClr val="accent4">
                     <a:lumMod val="75000"/>
@@ -9546,11 +9712,11 @@
               <a:t>multi-turn</a:t>
             </a:r>
             <a:r>
-              <a:rPr lang="vi-VN"/>
+              <a:rPr lang="vi-VN" dirty="0"/>
               <a:t> và 100 phiên với </a:t>
             </a:r>
             <a:r>
-              <a:rPr lang="vi-VN" b="1">
+              <a:rPr lang="vi-VN" b="1" dirty="0" err="1">
                 <a:solidFill>
                   <a:schemeClr val="accent2">
                     <a:lumMod val="75000"/>
@@ -9560,17 +9726,17 @@
               <a:t>one-shot</a:t>
             </a:r>
             <a:r>
-              <a:rPr lang="vi-VN"/>
+              <a:rPr lang="vi-VN" dirty="0"/>
               <a:t>.</a:t>
             </a:r>
           </a:p>
           <a:p>
             <a:r>
-              <a:rPr lang="vi-VN" b="1"/>
+              <a:rPr lang="vi-VN" b="1" dirty="0"/>
               <a:t>Kịch bản </a:t>
             </a:r>
             <a:r>
-              <a:rPr lang="vi-VN" b="1">
+              <a:rPr lang="vi-VN" b="1" dirty="0" err="1">
                 <a:solidFill>
                   <a:schemeClr val="accent4">
                     <a:lumMod val="75000"/>
@@ -9580,31 +9746,68 @@
               <a:t>multi-turn</a:t>
             </a:r>
             <a:r>
-              <a:rPr lang="vi-VN"/>
+              <a:rPr lang="vi-VN" dirty="0"/>
               <a:t>: </a:t>
             </a:r>
           </a:p>
           <a:p>
             <a:pPr lvl="1"/>
             <a:r>
-              <a:rPr lang="vi-VN"/>
-              <a:t>Mỗi phiên gồm tối đa 15 lượt prompt</a:t>
-            </a:r>
+              <a:rPr lang="vi-VN" dirty="0"/>
+              <a:t>Mỗi phiên gồm tối đa 1</a:t>
+            </a:r>
+            <a:r>
+              <a:rPr lang="en-US" dirty="0"/>
+              <a:t>0</a:t>
+            </a:r>
+            <a:r>
+              <a:rPr lang="vi-VN" dirty="0"/>
+              <a:t> lượt </a:t>
+            </a:r>
+            <a:r>
+              <a:rPr lang="vi-VN" dirty="0" err="1"/>
+              <a:t>prompt</a:t>
+            </a:r>
+            <a:endParaRPr lang="vi-VN" dirty="0"/>
           </a:p>
           <a:p>
             <a:pPr lvl="1"/>
             <a:r>
-              <a:rPr lang="vi-VN"/>
-              <a:t>Đánh giá được ghi lại ở mốc 5, 10 và 15 lượt.</a:t>
-            </a:r>
-          </a:p>
-          <a:p>
-            <a:r>
-              <a:rPr lang="vi-VN" b="1"/>
+              <a:rPr lang="vi-VN" dirty="0"/>
+              <a:t>Đánh giá được ghi lại ở mốc </a:t>
+            </a:r>
+            <a:r>
+              <a:rPr lang="en-US" dirty="0"/>
+              <a:t>2</a:t>
+            </a:r>
+            <a:r>
+              <a:rPr lang="vi-VN" dirty="0"/>
+              <a:t>, </a:t>
+            </a:r>
+            <a:r>
+              <a:rPr lang="en-US" dirty="0"/>
+              <a:t>5</a:t>
+            </a:r>
+            <a:r>
+              <a:rPr lang="vi-VN" dirty="0"/>
+              <a:t> và 1</a:t>
+            </a:r>
+            <a:r>
+              <a:rPr lang="en-US" dirty="0"/>
+              <a:t>0</a:t>
+            </a:r>
+            <a:r>
+              <a:rPr lang="vi-VN" dirty="0"/>
+              <a:t> lượt.</a:t>
+            </a:r>
+          </a:p>
+          <a:p>
+            <a:r>
+              <a:rPr lang="vi-VN" b="1" dirty="0"/>
               <a:t>Kịch bản </a:t>
             </a:r>
             <a:r>
-              <a:rPr lang="vi-VN" b="1">
+              <a:rPr lang="vi-VN" b="1" dirty="0" err="1">
                 <a:solidFill>
                   <a:schemeClr val="accent2">
                     <a:lumMod val="75000"/>
@@ -9614,39 +9817,47 @@
               <a:t>one-shot</a:t>
             </a:r>
             <a:r>
-              <a:rPr lang="vi-VN"/>
+              <a:rPr lang="vi-VN" dirty="0"/>
               <a:t>:</a:t>
             </a:r>
           </a:p>
           <a:p>
             <a:pPr lvl="1"/>
             <a:r>
-              <a:rPr lang="vi-VN"/>
-              <a:t>Mỗi truy vấn độc lập được đưa vào chatbot một lần</a:t>
+              <a:rPr lang="vi-VN" dirty="0"/>
+              <a:t>Mỗi truy vấn độc lập được đưa vào </a:t>
+            </a:r>
+            <a:r>
+              <a:rPr lang="vi-VN" dirty="0" err="1"/>
+              <a:t>chatbot</a:t>
+            </a:r>
+            <a:r>
+              <a:rPr lang="vi-VN" dirty="0"/>
+              <a:t> một lần</a:t>
             </a:r>
           </a:p>
           <a:p>
             <a:pPr lvl="1"/>
             <a:r>
-              <a:rPr lang="vi-VN"/>
+              <a:rPr lang="vi-VN" dirty="0"/>
               <a:t>Lặp lại 100 truy vấn để đánh giá tính ổn định và chính xác từ lượt đầu.</a:t>
             </a:r>
           </a:p>
           <a:p>
             <a:r>
-              <a:rPr lang="vi-VN" b="1"/>
+              <a:rPr lang="vi-VN" b="1" dirty="0"/>
               <a:t>Người đánh giá</a:t>
             </a:r>
             <a:r>
-              <a:rPr lang="vi-VN"/>
+              <a:rPr lang="vi-VN" dirty="0"/>
               <a:t>: các đánh giá viên là người thật (</a:t>
             </a:r>
             <a:r>
-              <a:rPr lang="vi-VN" i="1"/>
+              <a:rPr lang="vi-VN" i="1" dirty="0"/>
               <a:t>nhóm kiểm thử nội bộ</a:t>
             </a:r>
             <a:r>
-              <a:rPr lang="vi-VN"/>
+              <a:rPr lang="vi-VN" dirty="0"/>
               <a:t>), thực hiện hội thoại và chấm điểm theo cảm nhận cá nhân</a:t>
             </a:r>
           </a:p>
@@ -10603,8 +10814,8 @@
           </a:p>
         </p:txBody>
       </p:sp>
-      <mc:AlternateContent xmlns:mc="http://schemas.openxmlformats.org/markup-compatibility/2006" xmlns:a14="http://schemas.microsoft.com/office/drawing/2010/main">
-        <mc:Choice Requires="a14">
+      <mc:AlternateContent xmlns:mc="http://schemas.openxmlformats.org/markup-compatibility/2006">
+        <mc:Choice xmlns:a14="http://schemas.microsoft.com/office/drawing/2010/main" Requires="a14">
           <p:sp>
             <p:nvSpPr>
               <p:cNvPr id="13" name="Content Placeholder 12">
@@ -10627,68 +10838,68 @@
               <a:lstStyle/>
               <a:p>
                 <a:r>
-                  <a:rPr lang="vi-VN" b="1"/>
+                  <a:rPr lang="vi-VN" b="1" dirty="0"/>
                   <a:t>Độ thiện cảm tích lũy (</a:t>
                 </a:r>
                 <a:r>
-                  <a:rPr lang="vi-VN" b="1" i="1"/>
+                  <a:rPr lang="vi-VN" b="1" i="1" dirty="0" err="1"/>
                   <a:t>Cumulative</a:t>
                 </a:r>
                 <a:r>
-                  <a:rPr lang="vi-VN" i="1"/>
+                  <a:rPr lang="vi-VN" i="1" dirty="0"/>
                   <a:t> </a:t>
                 </a:r>
                 <a:r>
-                  <a:rPr lang="vi-VN" b="1" i="1"/>
+                  <a:rPr lang="vi-VN" b="1" i="1" dirty="0" err="1"/>
                   <a:t>likability</a:t>
                 </a:r>
                 <a:r>
-                  <a:rPr lang="vi-VN" b="1"/>
+                  <a:rPr lang="vi-VN" b="1" dirty="0"/>
                   <a:t>)</a:t>
                 </a:r>
                 <a:r>
-                  <a:rPr lang="vi-VN"/>
+                  <a:rPr lang="vi-VN" dirty="0"/>
                   <a:t>:</a:t>
                 </a:r>
               </a:p>
               <a:p>
                 <a:pPr lvl="1"/>
                 <a:r>
-                  <a:rPr lang="vi-VN" b="1"/>
+                  <a:rPr lang="vi-VN" b="1" dirty="0"/>
                   <a:t>Thang điểm</a:t>
                 </a:r>
                 <a:r>
-                  <a:rPr lang="vi-VN"/>
+                  <a:rPr lang="vi-VN" dirty="0"/>
                   <a:t>: 1-10 (</a:t>
                 </a:r>
                 <a:r>
-                  <a:rPr lang="vi-VN" i="1"/>
+                  <a:rPr lang="vi-VN" i="1" dirty="0"/>
                   <a:t>rất khó chịu - rất thân thiện</a:t>
                 </a:r>
                 <a:r>
-                  <a:rPr lang="vi-VN"/>
+                  <a:rPr lang="vi-VN" dirty="0"/>
                   <a:t>)</a:t>
                 </a:r>
               </a:p>
               <a:p>
                 <a:pPr lvl="1"/>
                 <a:r>
-                  <a:rPr lang="vi-VN" b="1"/>
+                  <a:rPr lang="vi-VN" b="1" dirty="0"/>
                   <a:t>Tiêu chí</a:t>
                 </a:r>
                 <a:r>
-                  <a:rPr lang="vi-VN"/>
+                  <a:rPr lang="vi-VN" dirty="0"/>
                   <a:t>: Dựa trên sự tự nhiên của văn phong, lịch sự và thân thiện, rõ ràng trong cách trình bày, tốc độ phản hồi cảm nhận.</a:t>
                 </a:r>
               </a:p>
               <a:p>
                 <a:pPr lvl="1"/>
                 <a:r>
-                  <a:rPr lang="vi-VN" b="1"/>
+                  <a:rPr lang="vi-VN" b="1" dirty="0"/>
                   <a:t>Công thức</a:t>
                 </a:r>
                 <a:r>
-                  <a:rPr lang="vi-VN"/>
+                  <a:rPr lang="vi-VN" dirty="0"/>
                   <a:t>: </a:t>
                 </a:r>
                 <a14:m>
@@ -10748,7 +10959,7 @@
                     </m:f>
                   </m:oMath>
                 </a14:m>
-                <a:endParaRPr lang="vi-VN"/>
+                <a:endParaRPr lang="vi-VN" dirty="0"/>
               </a:p>
               <a:p>
                 <a:pPr lvl="2"/>
@@ -10788,7 +10999,7 @@
                   </m:oMath>
                 </a14:m>
                 <a:r>
-                  <a:rPr lang="vi-VN"/>
+                  <a:rPr lang="vi-VN" dirty="0"/>
                   <a:t> là giá trị trung bình ở mốc </a:t>
                 </a:r>
                 <a14:m>
@@ -10805,7 +11016,7 @@
                   </m:oMath>
                 </a14:m>
                 <a:r>
-                  <a:rPr lang="vi-VN"/>
+                  <a:rPr lang="vi-VN" dirty="0"/>
                   <a:t> lượt (</a:t>
                 </a:r>
                 <a14:m>
@@ -10840,7 +11051,21 @@
                       </m:dPr>
                       <m:e>
                         <m:r>
-                          <a:rPr lang="vi-VN" i="1">
+                          <a:rPr lang="en-US" b="0" i="1" smtClean="0">
+                            <a:latin typeface="Cambria Math" panose="02040503050406030204" pitchFamily="18" charset="0"/>
+                            <a:ea typeface="Cambria Math" panose="02040503050406030204" pitchFamily="18" charset="0"/>
+                          </a:rPr>
+                          <m:t>2</m:t>
+                        </m:r>
+                        <m:r>
+                          <a:rPr lang="vi-VN" b="0" i="1" smtClean="0">
+                            <a:latin typeface="Cambria Math" panose="02040503050406030204" pitchFamily="18" charset="0"/>
+                            <a:ea typeface="Cambria Math" panose="02040503050406030204" pitchFamily="18" charset="0"/>
+                          </a:rPr>
+                          <m:t>, </m:t>
+                        </m:r>
+                        <m:r>
+                          <a:rPr lang="en-US" b="0" i="1" smtClean="0">
                             <a:latin typeface="Cambria Math" panose="02040503050406030204" pitchFamily="18" charset="0"/>
                             <a:ea typeface="Cambria Math" panose="02040503050406030204" pitchFamily="18" charset="0"/>
                           </a:rPr>
@@ -10858,28 +11083,21 @@
                             <a:latin typeface="Cambria Math" panose="02040503050406030204" pitchFamily="18" charset="0"/>
                             <a:ea typeface="Cambria Math" panose="02040503050406030204" pitchFamily="18" charset="0"/>
                           </a:rPr>
-                          <m:t>10</m:t>
+                          <m:t>1</m:t>
                         </m:r>
                         <m:r>
-                          <a:rPr lang="vi-VN" b="0" i="1" smtClean="0">
+                          <a:rPr lang="en-US" b="0" i="1" smtClean="0">
                             <a:latin typeface="Cambria Math" panose="02040503050406030204" pitchFamily="18" charset="0"/>
                             <a:ea typeface="Cambria Math" panose="02040503050406030204" pitchFamily="18" charset="0"/>
                           </a:rPr>
-                          <m:t>, </m:t>
-                        </m:r>
-                        <m:r>
-                          <a:rPr lang="vi-VN" i="1">
-                            <a:latin typeface="Cambria Math" panose="02040503050406030204" pitchFamily="18" charset="0"/>
-                            <a:ea typeface="Cambria Math" panose="02040503050406030204" pitchFamily="18" charset="0"/>
-                          </a:rPr>
-                          <m:t>15</m:t>
+                          <m:t>0</m:t>
                         </m:r>
                       </m:e>
                     </m:d>
                   </m:oMath>
                 </a14:m>
                 <a:r>
-                  <a:rPr lang="vi-VN"/>
+                  <a:rPr lang="vi-VN" dirty="0"/>
                   <a:t>)</a:t>
                 </a:r>
               </a:p>
@@ -10899,14 +11117,14 @@
                   </m:oMath>
                 </a14:m>
                 <a:r>
-                  <a:rPr lang="vi-VN"/>
+                  <a:rPr lang="vi-VN" dirty="0"/>
                   <a:t> là số phiên</a:t>
                 </a:r>
               </a:p>
             </p:txBody>
           </p:sp>
         </mc:Choice>
-        <mc:Fallback xmlns="">
+        <mc:Fallback>
           <p:sp>
             <p:nvSpPr>
               <p:cNvPr id="13" name="Content Placeholder 12">
@@ -10936,7 +11154,7 @@
               <a:lstStyle/>
               <a:p>
                 <a:r>
-                  <a:rPr lang="vi-VN">
+                  <a:rPr lang="en-US">
                     <a:noFill/>
                   </a:rPr>
                   <a:t> </a:t>
@@ -12336,8 +12554,8 @@
           </a:p>
         </p:txBody>
       </p:sp>
-      <mc:AlternateContent xmlns:mc="http://schemas.openxmlformats.org/markup-compatibility/2006" xmlns:a14="http://schemas.microsoft.com/office/drawing/2010/main">
-        <mc:Choice Requires="a14">
+      <mc:AlternateContent xmlns:mc="http://schemas.openxmlformats.org/markup-compatibility/2006">
+        <mc:Choice xmlns:a14="http://schemas.microsoft.com/office/drawing/2010/main" Requires="a14">
           <p:sp>
             <p:nvSpPr>
               <p:cNvPr id="3" name="Content Placeholder 2">
@@ -12360,26 +12578,34 @@
               <a:lstStyle/>
               <a:p>
                 <a:r>
-                  <a:rPr lang="vi-VN" b="1"/>
+                  <a:rPr lang="vi-VN" b="1" dirty="0"/>
                   <a:t>Độ chính xác tích lũy (</a:t>
                 </a:r>
                 <a:r>
-                  <a:rPr lang="vi-VN" b="1" i="1"/>
-                  <a:t>Cumulative accuracy</a:t>
+                  <a:rPr lang="vi-VN" b="1" i="1" dirty="0" err="1"/>
+                  <a:t>Cumulative</a:t>
                 </a:r>
                 <a:r>
-                  <a:rPr lang="vi-VN" b="1"/>
+                  <a:rPr lang="vi-VN" b="1" i="1" dirty="0"/>
+                  <a:t> </a:t>
+                </a:r>
+                <a:r>
+                  <a:rPr lang="vi-VN" b="1" i="1" dirty="0" err="1"/>
+                  <a:t>accuracy</a:t>
+                </a:r>
+                <a:r>
+                  <a:rPr lang="vi-VN" b="1" dirty="0"/>
                   <a:t>)</a:t>
                 </a:r>
                 <a:r>
-                  <a:rPr lang="vi-VN"/>
+                  <a:rPr lang="vi-VN" dirty="0"/>
                   <a:t>:</a:t>
                 </a:r>
               </a:p>
               <a:p>
                 <a:pPr lvl="1"/>
                 <a:r>
-                  <a:rPr lang="vi-VN"/>
+                  <a:rPr lang="vi-VN" dirty="0"/>
                   <a:t>Với mỗi phiên </a:t>
                 </a:r>
                 <a14:m>
@@ -12396,7 +12622,7 @@
                   </m:oMath>
                 </a14:m>
                 <a:r>
-                  <a:rPr lang="vi-VN"/>
+                  <a:rPr lang="vi-VN" dirty="0"/>
                   <a:t> tại mốc </a:t>
                 </a:r>
                 <a14:m>
@@ -12413,7 +12639,7 @@
                   </m:oMath>
                 </a14:m>
                 <a:r>
-                  <a:rPr lang="vi-VN"/>
+                  <a:rPr lang="vi-VN" dirty="0"/>
                   <a:t> lượt, định nghĩa:</a:t>
                 </a:r>
               </a:p>
@@ -12720,10 +12946,10 @@
                             <m:t>1</m:t>
                           </m:r>
                           <m:r>
-                            <a:rPr lang="vi-VN" b="0" i="1" smtClean="0">
+                            <a:rPr lang="en-US" b="0" i="1" smtClean="0">
                               <a:latin typeface="Cambria Math" panose="02040503050406030204" pitchFamily="18" charset="0"/>
                             </a:rPr>
-                            <m:t>, </m:t>
+                            <m:t>…</m:t>
                           </m:r>
                           <m:r>
                             <m:rPr>
@@ -12750,12 +12976,12 @@
                     </m:oMath>
                   </m:oMathPara>
                 </a14:m>
-                <a:endParaRPr lang="vi-VN"/>
+                <a:endParaRPr lang="vi-VN" dirty="0"/>
               </a:p>
               <a:p>
                 <a:pPr lvl="1"/>
                 <a:r>
-                  <a:rPr lang="vi-VN"/>
+                  <a:rPr lang="vi-VN" dirty="0"/>
                   <a:t>Qua S phiên, độ chính xác tích lũy tại mốc n là:</a:t>
                 </a:r>
               </a:p>
@@ -12948,42 +13174,42 @@
                     </m:oMath>
                   </m:oMathPara>
                 </a14:m>
-                <a:endParaRPr lang="vi-VN"/>
+                <a:endParaRPr lang="vi-VN" dirty="0"/>
               </a:p>
               <a:p>
                 <a:pPr lvl="1"/>
                 <a:r>
-                  <a:rPr lang="vi-VN" b="1"/>
+                  <a:rPr lang="vi-VN" b="1" dirty="0"/>
                   <a:t>“Câu trả lời đúng” </a:t>
                 </a:r>
                 <a:r>
-                  <a:rPr lang="vi-VN"/>
+                  <a:rPr lang="vi-VN" dirty="0"/>
                   <a:t>được hiểu là: nội dung trả lời khớp (</a:t>
                 </a:r>
                 <a:r>
-                  <a:rPr lang="vi-VN" i="1"/>
+                  <a:rPr lang="vi-VN" i="1" dirty="0"/>
                   <a:t>hoặc bao gồm</a:t>
                 </a:r>
                 <a:r>
-                  <a:rPr lang="vi-VN"/>
+                  <a:rPr lang="vi-VN" dirty="0"/>
                   <a:t>) thông tin xác thực có trong cơ sở dữ liệu.</a:t>
                 </a:r>
               </a:p>
               <a:p>
                 <a:pPr lvl="1"/>
                 <a:r>
-                  <a:rPr lang="vi-VN" b="1"/>
+                  <a:rPr lang="vi-VN" b="1" dirty="0"/>
                   <a:t>“Câu trả lời sai”</a:t>
                 </a:r>
                 <a:r>
-                  <a:rPr lang="vi-VN"/>
+                  <a:rPr lang="vi-VN" dirty="0"/>
                   <a:t> được hiểu là: nội dung trả lời không có trong cơ sở dữ liệu, sai trọng tâm yêu cầu hoặc bịa đặt thông tin</a:t>
                 </a:r>
               </a:p>
             </p:txBody>
           </p:sp>
         </mc:Choice>
-        <mc:Fallback xmlns="">
+        <mc:Fallback>
           <p:sp>
             <p:nvSpPr>
               <p:cNvPr id="3" name="Content Placeholder 2">
@@ -13013,7 +13239,7 @@
               <a:lstStyle/>
               <a:p>
                 <a:r>
-                  <a:rPr lang="vi-VN">
+                  <a:rPr lang="en-US">
                     <a:noFill/>
                   </a:rPr>
                   <a:t> </a:t>
@@ -15759,8 +15985,8 @@
           </a:p>
         </p:txBody>
       </p:sp>
-      <mc:AlternateContent xmlns:mc="http://schemas.openxmlformats.org/markup-compatibility/2006" xmlns:a14="http://schemas.microsoft.com/office/drawing/2010/main">
-        <mc:Choice Requires="a14">
+      <mc:AlternateContent xmlns:mc="http://schemas.openxmlformats.org/markup-compatibility/2006">
+        <mc:Choice xmlns:a14="http://schemas.microsoft.com/office/drawing/2010/main" Requires="a14">
           <p:sp>
             <p:nvSpPr>
               <p:cNvPr id="3" name="Content Placeholder 2">
@@ -15783,18 +16009,22 @@
               <a:lstStyle/>
               <a:p>
                 <a:r>
-                  <a:rPr lang="vi-VN" b="1"/>
-                  <a:t>Độ chính xác one-shot</a:t>
+                  <a:rPr lang="vi-VN" b="1" dirty="0"/>
+                  <a:t>Độ chính xác </a:t>
                 </a:r>
                 <a:r>
-                  <a:rPr lang="vi-VN"/>
+                  <a:rPr lang="vi-VN" b="1" dirty="0" err="1"/>
+                  <a:t>one-shot</a:t>
+                </a:r>
+                <a:r>
+                  <a:rPr lang="vi-VN" dirty="0"/>
                   <a:t>:</a:t>
                 </a:r>
               </a:p>
               <a:p>
                 <a:pPr lvl="1"/>
                 <a:r>
-                  <a:rPr lang="vi-VN"/>
+                  <a:rPr lang="vi-VN" dirty="0"/>
                   <a:t>Với </a:t>
                 </a:r>
                 <a14:m>
@@ -15823,190 +16053,168 @@
                   </m:oMath>
                 </a14:m>
                 <a:r>
-                  <a:rPr lang="vi-VN"/>
-                  <a:t> truy vấn độc lập, mỗi truy vấn có </a:t>
+                  <a:rPr lang="vi-VN" dirty="0"/>
+                  <a:t> truy vấn độc lập, </a:t>
                 </a:r>
-                <a14:m>
-                  <m:oMath xmlns:m="http://schemas.openxmlformats.org/officeDocument/2006/math">
-                    <m:r>
-                      <m:rPr>
-                        <m:sty m:val="p"/>
-                      </m:rPr>
-                      <a:rPr lang="vi-VN">
-                        <a:latin typeface="Cambria Math" panose="02040503050406030204" pitchFamily="18" charset="0"/>
-                      </a:rPr>
-                      <m:t>i</m:t>
-                    </m:r>
-                  </m:oMath>
-                </a14:m>
                 <a:r>
-                  <a:rPr lang="vi-VN"/>
-                  <a:t> nhãn</a:t>
+                  <a:rPr lang="en-US" dirty="0" err="1"/>
+                  <a:t>hệ</a:t>
                 </a:r>
-                <a14:m>
-                  <m:oMath xmlns:m="http://schemas.openxmlformats.org/officeDocument/2006/math">
-                    <m:r>
-                      <a:rPr lang="vi-VN" b="0" i="0" smtClean="0">
-                        <a:latin typeface="Cambria Math" panose="02040503050406030204" pitchFamily="18" charset="0"/>
-                      </a:rPr>
-                      <m:t> </m:t>
-                    </m:r>
-                    <m:sSub>
-                      <m:sSubPr>
-                        <m:ctrlPr>
-                          <a:rPr lang="vi-VN" i="1" smtClean="0">
-                            <a:latin typeface="Cambria Math" panose="02040503050406030204" pitchFamily="18" charset="0"/>
-                          </a:rPr>
-                        </m:ctrlPr>
-                      </m:sSubPr>
-                      <m:e>
-                        <m:r>
-                          <m:rPr>
-                            <m:sty m:val="p"/>
-                          </m:rPr>
-                          <a:rPr lang="vi-VN" i="1">
-                            <a:latin typeface="Cambria Math" panose="02040503050406030204" pitchFamily="18" charset="0"/>
-                          </a:rPr>
-                          <m:t>c</m:t>
-                        </m:r>
-                      </m:e>
-                      <m:sub>
-                        <m:r>
-                          <m:rPr>
-                            <m:sty m:val="p"/>
-                          </m:rPr>
-                          <a:rPr lang="vi-VN" i="1">
-                            <a:latin typeface="Cambria Math" panose="02040503050406030204" pitchFamily="18" charset="0"/>
-                          </a:rPr>
-                          <m:t>i</m:t>
-                        </m:r>
-                      </m:sub>
-                    </m:sSub>
-                    <m:r>
-                      <a:rPr lang="vi-VN" i="1" smtClean="0">
-                        <a:latin typeface="Cambria Math" panose="02040503050406030204" pitchFamily="18" charset="0"/>
-                        <a:ea typeface="Cambria Math" panose="02040503050406030204" pitchFamily="18" charset="0"/>
-                      </a:rPr>
-                      <m:t>𝜖</m:t>
-                    </m:r>
-                    <m:d>
-                      <m:dPr>
-                        <m:begChr m:val="{"/>
-                        <m:endChr m:val="}"/>
-                        <m:ctrlPr>
-                          <a:rPr lang="vi-VN" i="1" smtClean="0">
-                            <a:latin typeface="Cambria Math" panose="02040503050406030204" pitchFamily="18" charset="0"/>
-                            <a:ea typeface="Cambria Math" panose="02040503050406030204" pitchFamily="18" charset="0"/>
-                          </a:rPr>
-                        </m:ctrlPr>
-                      </m:dPr>
-                      <m:e>
-                        <m:r>
-                          <a:rPr lang="vi-VN" i="1">
-                            <a:latin typeface="Cambria Math" panose="02040503050406030204" pitchFamily="18" charset="0"/>
-                            <a:ea typeface="Cambria Math" panose="02040503050406030204" pitchFamily="18" charset="0"/>
-                          </a:rPr>
-                          <m:t>0</m:t>
-                        </m:r>
-                        <m:r>
-                          <a:rPr lang="vi-VN" b="0" i="1" smtClean="0">
-                            <a:latin typeface="Cambria Math" panose="02040503050406030204" pitchFamily="18" charset="0"/>
-                            <a:ea typeface="Cambria Math" panose="02040503050406030204" pitchFamily="18" charset="0"/>
-                          </a:rPr>
-                          <m:t>, </m:t>
-                        </m:r>
-                        <m:r>
-                          <a:rPr lang="vi-VN" i="1">
-                            <a:latin typeface="Cambria Math" panose="02040503050406030204" pitchFamily="18" charset="0"/>
-                            <a:ea typeface="Cambria Math" panose="02040503050406030204" pitchFamily="18" charset="0"/>
-                          </a:rPr>
-                          <m:t>1</m:t>
-                        </m:r>
-                      </m:e>
-                    </m:d>
-                    <m:d>
-                      <m:dPr>
-                        <m:ctrlPr>
-                          <a:rPr lang="vi-VN" i="1" smtClean="0">
-                            <a:latin typeface="Cambria Math" panose="02040503050406030204" pitchFamily="18" charset="0"/>
-                            <a:ea typeface="Cambria Math" panose="02040503050406030204" pitchFamily="18" charset="0"/>
-                          </a:rPr>
-                        </m:ctrlPr>
-                      </m:dPr>
-                      <m:e>
-                        <m:r>
-                          <a:rPr lang="vi-VN" i="1">
-                            <a:latin typeface="Cambria Math" panose="02040503050406030204" pitchFamily="18" charset="0"/>
-                            <a:ea typeface="Cambria Math" panose="02040503050406030204" pitchFamily="18" charset="0"/>
-                          </a:rPr>
-                          <m:t>0</m:t>
-                        </m:r>
-                        <m:r>
-                          <a:rPr lang="vi-VN" b="0" i="1" smtClean="0">
-                            <a:latin typeface="Cambria Math" panose="02040503050406030204" pitchFamily="18" charset="0"/>
-                            <a:ea typeface="Cambria Math" panose="02040503050406030204" pitchFamily="18" charset="0"/>
-                          </a:rPr>
-                          <m:t>=</m:t>
-                        </m:r>
-                        <m:r>
-                          <m:rPr>
-                            <m:sty m:val="p"/>
-                          </m:rPr>
-                          <a:rPr lang="vi-VN" i="1">
-                            <a:latin typeface="Cambria Math" panose="02040503050406030204" pitchFamily="18" charset="0"/>
-                            <a:ea typeface="Cambria Math" panose="02040503050406030204" pitchFamily="18" charset="0"/>
-                          </a:rPr>
-                          <m:t>sai</m:t>
-                        </m:r>
-                        <m:r>
-                          <a:rPr lang="vi-VN" b="0" i="1" smtClean="0">
-                            <a:latin typeface="Cambria Math" panose="02040503050406030204" pitchFamily="18" charset="0"/>
-                            <a:ea typeface="Cambria Math" panose="02040503050406030204" pitchFamily="18" charset="0"/>
-                          </a:rPr>
-                          <m:t>, </m:t>
-                        </m:r>
-                        <m:r>
-                          <a:rPr lang="vi-VN" i="1">
-                            <a:latin typeface="Cambria Math" panose="02040503050406030204" pitchFamily="18" charset="0"/>
-                            <a:ea typeface="Cambria Math" panose="02040503050406030204" pitchFamily="18" charset="0"/>
-                          </a:rPr>
-                          <m:t>1</m:t>
-                        </m:r>
-                        <m:r>
-                          <a:rPr lang="vi-VN" b="0" i="1" smtClean="0">
-                            <a:latin typeface="Cambria Math" panose="02040503050406030204" pitchFamily="18" charset="0"/>
-                            <a:ea typeface="Cambria Math" panose="02040503050406030204" pitchFamily="18" charset="0"/>
-                          </a:rPr>
-                          <m:t>=</m:t>
-                        </m:r>
-                        <m:r>
-                          <a:rPr lang="vi-VN" i="1">
-                            <a:latin typeface="Cambria Math" panose="02040503050406030204" pitchFamily="18" charset="0"/>
-                            <a:ea typeface="Cambria Math" panose="02040503050406030204" pitchFamily="18" charset="0"/>
-                          </a:rPr>
-                          <m:t>đú</m:t>
-                        </m:r>
-                        <m:r>
-                          <m:rPr>
-                            <m:sty m:val="p"/>
-                          </m:rPr>
-                          <a:rPr lang="vi-VN" i="1">
-                            <a:latin typeface="Cambria Math" panose="02040503050406030204" pitchFamily="18" charset="0"/>
-                            <a:ea typeface="Cambria Math" panose="02040503050406030204" pitchFamily="18" charset="0"/>
-                          </a:rPr>
-                          <m:t>ng</m:t>
-                        </m:r>
-                      </m:e>
-                    </m:d>
-                  </m:oMath>
-                </a14:m>
-                <a:endParaRPr lang="vi-VN"/>
+                <a:r>
+                  <a:rPr lang="en-US" dirty="0"/>
+                  <a:t> </a:t>
+                </a:r>
+                <a:r>
+                  <a:rPr lang="en-US" dirty="0" err="1"/>
+                  <a:t>thống</a:t>
+                </a:r>
+                <a:r>
+                  <a:rPr lang="en-US" dirty="0"/>
+                  <a:t> </a:t>
+                </a:r>
+                <a:r>
+                  <a:rPr lang="en-US" dirty="0" err="1"/>
+                  <a:t>trả</a:t>
+                </a:r>
+                <a:r>
+                  <a:rPr lang="en-US" dirty="0"/>
+                  <a:t> </a:t>
+                </a:r>
+                <a:r>
+                  <a:rPr lang="en-US" dirty="0" err="1"/>
+                  <a:t>lời</a:t>
+                </a:r>
+                <a:r>
+                  <a:rPr lang="en-US" dirty="0"/>
+                  <a:t> 1 </a:t>
+                </a:r>
+                <a:r>
+                  <a:rPr lang="en-US" dirty="0" err="1"/>
+                  <a:t>lần</a:t>
+                </a:r>
+                <a:r>
+                  <a:rPr lang="en-US" dirty="0"/>
+                  <a:t> </a:t>
+                </a:r>
+                <a:r>
+                  <a:rPr lang="en-US" dirty="0" err="1"/>
+                  <a:t>cho</a:t>
+                </a:r>
+                <a:r>
+                  <a:rPr lang="en-US" dirty="0"/>
+                  <a:t> </a:t>
+                </a:r>
+                <a:r>
+                  <a:rPr lang="en-US" dirty="0" err="1"/>
+                  <a:t>mỗi</a:t>
+                </a:r>
+                <a:r>
+                  <a:rPr lang="en-US" dirty="0"/>
+                  <a:t> </a:t>
+                </a:r>
+                <a:r>
+                  <a:rPr lang="en-US" dirty="0" err="1"/>
+                  <a:t>truy</a:t>
+                </a:r>
+                <a:r>
+                  <a:rPr lang="en-US" dirty="0"/>
+                  <a:t> </a:t>
+                </a:r>
+                <a:r>
+                  <a:rPr lang="en-US" dirty="0" err="1"/>
+                  <a:t>vấn</a:t>
+                </a:r>
+                <a:r>
+                  <a:rPr lang="en-US" dirty="0"/>
+                  <a:t>, </a:t>
+                </a:r>
+                <a:r>
+                  <a:rPr lang="en-US" dirty="0" err="1"/>
+                  <a:t>đánh</a:t>
+                </a:r>
+                <a:r>
+                  <a:rPr lang="en-US" dirty="0"/>
+                  <a:t> </a:t>
+                </a:r>
+                <a:r>
+                  <a:rPr lang="en-US" dirty="0" err="1"/>
+                  <a:t>giá</a:t>
+                </a:r>
+                <a:r>
+                  <a:rPr lang="en-US" dirty="0"/>
+                  <a:t> </a:t>
+                </a:r>
+                <a:r>
+                  <a:rPr lang="en-US" dirty="0" err="1"/>
+                  <a:t>viên</a:t>
+                </a:r>
+                <a:r>
+                  <a:rPr lang="en-US" dirty="0"/>
+                  <a:t> </a:t>
+                </a:r>
+                <a:r>
+                  <a:rPr lang="en-US" dirty="0" err="1"/>
+                  <a:t>gán</a:t>
+                </a:r>
+                <a:r>
+                  <a:rPr lang="en-US" dirty="0"/>
+                  <a:t> </a:t>
+                </a:r>
+                <a:r>
+                  <a:rPr lang="en-US" dirty="0" err="1"/>
+                  <a:t>điểm</a:t>
+                </a:r>
+                <a:r>
+                  <a:rPr lang="en-US" dirty="0"/>
+                  <a:t> </a:t>
+                </a:r>
+                <a:r>
+                  <a:rPr lang="en-US" dirty="0" err="1"/>
+                  <a:t>số</a:t>
+                </a:r>
+                <a:r>
+                  <a:rPr lang="en-US" dirty="0"/>
+                  <a:t> từ 1 đến 10 </a:t>
+                </a:r>
+                <a:r>
+                  <a:rPr lang="en-US" dirty="0" err="1"/>
+                  <a:t>cho</a:t>
+                </a:r>
+                <a:r>
+                  <a:rPr lang="en-US" dirty="0"/>
+                  <a:t> </a:t>
+                </a:r>
+                <a:r>
+                  <a:rPr lang="en-US" dirty="0" err="1"/>
+                  <a:t>từng</a:t>
+                </a:r>
+                <a:r>
+                  <a:rPr lang="en-US" dirty="0"/>
+                  <a:t> </a:t>
+                </a:r>
+                <a:r>
+                  <a:rPr lang="en-US" dirty="0" err="1"/>
+                  <a:t>phản</a:t>
+                </a:r>
+                <a:r>
+                  <a:rPr lang="en-US" dirty="0"/>
+                  <a:t> </a:t>
+                </a:r>
+                <a:r>
+                  <a:rPr lang="en-US" dirty="0" err="1"/>
+                  <a:t>hồi</a:t>
+                </a:r>
+                <a:r>
+                  <a:rPr lang="en-US" dirty="0"/>
+                  <a:t>.</a:t>
+                </a:r>
+                <a:endParaRPr lang="vi-VN" dirty="0"/>
               </a:p>
               <a:p>
                 <a:pPr marL="457200" lvl="1" indent="0">
                   <a:buNone/>
                 </a:pPr>
-                <a:endParaRPr lang="vi-VN"/>
+                <a:endParaRPr lang="vi-VN" dirty="0"/>
               </a:p>
               <a:p>
                 <a:pPr marL="457200" lvl="1" indent="0">
@@ -16143,12 +16351,12 @@
                     </m:oMath>
                   </m:oMathPara>
                 </a14:m>
-                <a:endParaRPr lang="vi-VN"/>
+                <a:endParaRPr lang="vi-VN" dirty="0"/>
               </a:p>
             </p:txBody>
           </p:sp>
         </mc:Choice>
-        <mc:Fallback xmlns="">
+        <mc:Fallback>
           <p:sp>
             <p:nvSpPr>
               <p:cNvPr id="3" name="Content Placeholder 2">
@@ -16169,7 +16377,7 @@
               <a:blipFill>
                 <a:blip r:embed="rId2"/>
                 <a:stretch>
-                  <a:fillRect l="-1043" t="-3672"/>
+                  <a:fillRect l="-1043" t="-2203"/>
                 </a:stretch>
               </a:blipFill>
             </p:spPr>
@@ -16178,7 +16386,7 @@
               <a:lstStyle/>
               <a:p>
                 <a:r>
-                  <a:rPr lang="vi-VN">
+                  <a:rPr lang="en-US">
                     <a:noFill/>
                   </a:rPr>
                   <a:t> </a:t>
@@ -17033,40 +17241,671 @@
           </a:p>
         </p:txBody>
       </p:sp>
-      <p:sp>
-        <p:nvSpPr>
-          <p:cNvPr id="3" name="Content Placeholder 2">
+      <p:graphicFrame>
+        <p:nvGraphicFramePr>
+          <p:cNvPr id="6" name="Chỗ dành sẵn cho Nội dung 5">
             <a:extLst>
               <a:ext uri="{FF2B5EF4-FFF2-40B4-BE49-F238E27FC236}">
-                <a16:creationId xmlns:a16="http://schemas.microsoft.com/office/drawing/2014/main" id="{5FCE16F7-07DC-B605-2392-0A7914E83DAC}"/>
+                <a16:creationId xmlns:a16="http://schemas.microsoft.com/office/drawing/2014/main" id="{AC1759D8-3A99-6469-C2F1-B52F74AC9564}"/>
               </a:ext>
             </a:extLst>
           </p:cNvPr>
-          <p:cNvSpPr>
-            <a:spLocks noGrp="1"/>
-          </p:cNvSpPr>
+          <p:cNvGraphicFramePr>
+            <a:graphicFrameLocks noGrp="1"/>
+          </p:cNvGraphicFramePr>
           <p:nvPr>
             <p:ph idx="1"/>
+            <p:extLst>
+              <p:ext uri="{D42A27DB-BD31-4B8C-83A1-F6EECF244321}">
+                <p14:modId xmlns:p14="http://schemas.microsoft.com/office/powerpoint/2010/main" val="3057695870"/>
+              </p:ext>
+            </p:extLst>
           </p:nvPr>
-        </p:nvSpPr>
-        <p:spPr/>
-        <p:txBody>
-          <a:bodyPr/>
-          <a:lstStyle/>
-          <a:p>
-            <a:r>
-              <a:rPr lang="vi-VN"/>
-              <a:t>KẾT QUẢ</a:t>
-            </a:r>
-          </a:p>
-          <a:p>
-            <a:r>
-              <a:rPr lang="vi-VN"/>
-              <a:t>Kết luận</a:t>
-            </a:r>
-          </a:p>
-        </p:txBody>
-      </p:sp>
+        </p:nvGraphicFramePr>
+        <p:xfrm>
+          <a:off x="838200" y="1930866"/>
+          <a:ext cx="10515600" cy="1981200"/>
+        </p:xfrm>
+        <a:graphic>
+          <a:graphicData uri="http://schemas.openxmlformats.org/drawingml/2006/table">
+            <a:tbl>
+              <a:tblPr firstRow="1" bandRow="1">
+                <a:tableStyleId>{5C22544A-7EE6-4342-B048-85BDC9FD1C3A}</a:tableStyleId>
+              </a:tblPr>
+              <a:tblGrid>
+                <a:gridCol w="2103120">
+                  <a:extLst>
+                    <a:ext uri="{9D8B030D-6E8A-4147-A177-3AD203B41FA5}">
+                      <a16:colId xmlns:a16="http://schemas.microsoft.com/office/drawing/2014/main" val="974202303"/>
+                    </a:ext>
+                  </a:extLst>
+                </a:gridCol>
+                <a:gridCol w="2103120">
+                  <a:extLst>
+                    <a:ext uri="{9D8B030D-6E8A-4147-A177-3AD203B41FA5}">
+                      <a16:colId xmlns:a16="http://schemas.microsoft.com/office/drawing/2014/main" val="4041585590"/>
+                    </a:ext>
+                  </a:extLst>
+                </a:gridCol>
+                <a:gridCol w="2103120">
+                  <a:extLst>
+                    <a:ext uri="{9D8B030D-6E8A-4147-A177-3AD203B41FA5}">
+                      <a16:colId xmlns:a16="http://schemas.microsoft.com/office/drawing/2014/main" val="417388301"/>
+                    </a:ext>
+                  </a:extLst>
+                </a:gridCol>
+                <a:gridCol w="2103120">
+                  <a:extLst>
+                    <a:ext uri="{9D8B030D-6E8A-4147-A177-3AD203B41FA5}">
+                      <a16:colId xmlns:a16="http://schemas.microsoft.com/office/drawing/2014/main" val="1491150681"/>
+                    </a:ext>
+                  </a:extLst>
+                </a:gridCol>
+                <a:gridCol w="2103120">
+                  <a:extLst>
+                    <a:ext uri="{9D8B030D-6E8A-4147-A177-3AD203B41FA5}">
+                      <a16:colId xmlns:a16="http://schemas.microsoft.com/office/drawing/2014/main" val="1487681724"/>
+                    </a:ext>
+                  </a:extLst>
+                </a:gridCol>
+              </a:tblGrid>
+              <a:tr h="370840">
+                <a:tc rowSpan="2">
+                  <a:txBody>
+                    <a:bodyPr/>
+                    <a:lstStyle/>
+                    <a:p>
+                      <a:pPr algn="ctr"/>
+                      <a:r>
+                        <a:rPr lang="en-US" sz="2000" dirty="0" err="1">
+                          <a:latin typeface="Times New Roman" panose="02020603050405020304" pitchFamily="18" charset="0"/>
+                          <a:cs typeface="Times New Roman" panose="02020603050405020304" pitchFamily="18" charset="0"/>
+                        </a:rPr>
+                        <a:t>Mốc</a:t>
+                      </a:r>
+                      <a:endParaRPr lang="en-US" sz="2000" dirty="0">
+                        <a:latin typeface="Times New Roman" panose="02020603050405020304" pitchFamily="18" charset="0"/>
+                        <a:cs typeface="Times New Roman" panose="02020603050405020304" pitchFamily="18" charset="0"/>
+                      </a:endParaRPr>
+                    </a:p>
+                  </a:txBody>
+                  <a:tcPr/>
+                </a:tc>
+                <a:tc gridSpan="2">
+                  <a:txBody>
+                    <a:bodyPr/>
+                    <a:lstStyle/>
+                    <a:p>
+                      <a:pPr algn="ctr"/>
+                      <a:r>
+                        <a:rPr lang="en-US" sz="2000" dirty="0" err="1">
+                          <a:latin typeface="Times New Roman" panose="02020603050405020304" pitchFamily="18" charset="0"/>
+                          <a:cs typeface="Times New Roman" panose="02020603050405020304" pitchFamily="18" charset="0"/>
+                        </a:rPr>
+                        <a:t>Độ</a:t>
+                      </a:r>
+                      <a:r>
+                        <a:rPr lang="en-US" sz="2000" dirty="0">
+                          <a:latin typeface="Times New Roman" panose="02020603050405020304" pitchFamily="18" charset="0"/>
+                          <a:cs typeface="Times New Roman" panose="02020603050405020304" pitchFamily="18" charset="0"/>
+                        </a:rPr>
+                        <a:t> </a:t>
+                      </a:r>
+                      <a:r>
+                        <a:rPr lang="en-US" sz="2000" dirty="0" err="1">
+                          <a:latin typeface="Times New Roman" panose="02020603050405020304" pitchFamily="18" charset="0"/>
+                          <a:cs typeface="Times New Roman" panose="02020603050405020304" pitchFamily="18" charset="0"/>
+                        </a:rPr>
+                        <a:t>thiện</a:t>
+                      </a:r>
+                      <a:r>
+                        <a:rPr lang="en-US" sz="2000" dirty="0">
+                          <a:latin typeface="Times New Roman" panose="02020603050405020304" pitchFamily="18" charset="0"/>
+                          <a:cs typeface="Times New Roman" panose="02020603050405020304" pitchFamily="18" charset="0"/>
+                        </a:rPr>
+                        <a:t> </a:t>
+                      </a:r>
+                      <a:r>
+                        <a:rPr lang="en-US" sz="2000" dirty="0" err="1">
+                          <a:latin typeface="Times New Roman" panose="02020603050405020304" pitchFamily="18" charset="0"/>
+                          <a:cs typeface="Times New Roman" panose="02020603050405020304" pitchFamily="18" charset="0"/>
+                        </a:rPr>
+                        <a:t>cảm</a:t>
+                      </a:r>
+                      <a:endParaRPr lang="en-US" sz="2000" dirty="0">
+                        <a:latin typeface="Times New Roman" panose="02020603050405020304" pitchFamily="18" charset="0"/>
+                        <a:cs typeface="Times New Roman" panose="02020603050405020304" pitchFamily="18" charset="0"/>
+                      </a:endParaRPr>
+                    </a:p>
+                  </a:txBody>
+                  <a:tcPr/>
+                </a:tc>
+                <a:tc hMerge="1">
+                  <a:txBody>
+                    <a:bodyPr/>
+                    <a:lstStyle/>
+                    <a:p>
+                      <a:endParaRPr lang="en-US" dirty="0"/>
+                    </a:p>
+                  </a:txBody>
+                  <a:tcPr/>
+                </a:tc>
+                <a:tc gridSpan="2">
+                  <a:txBody>
+                    <a:bodyPr/>
+                    <a:lstStyle/>
+                    <a:p>
+                      <a:pPr algn="ctr"/>
+                      <a:r>
+                        <a:rPr lang="en-US" sz="2000" dirty="0" err="1">
+                          <a:latin typeface="Times New Roman" panose="02020603050405020304" pitchFamily="18" charset="0"/>
+                          <a:cs typeface="Times New Roman" panose="02020603050405020304" pitchFamily="18" charset="0"/>
+                        </a:rPr>
+                        <a:t>Độ</a:t>
+                      </a:r>
+                      <a:r>
+                        <a:rPr lang="en-US" sz="2000" dirty="0">
+                          <a:latin typeface="Times New Roman" panose="02020603050405020304" pitchFamily="18" charset="0"/>
+                          <a:cs typeface="Times New Roman" panose="02020603050405020304" pitchFamily="18" charset="0"/>
+                        </a:rPr>
+                        <a:t> </a:t>
+                      </a:r>
+                      <a:r>
+                        <a:rPr lang="en-US" sz="2000" dirty="0" err="1">
+                          <a:latin typeface="Times New Roman" panose="02020603050405020304" pitchFamily="18" charset="0"/>
+                          <a:cs typeface="Times New Roman" panose="02020603050405020304" pitchFamily="18" charset="0"/>
+                        </a:rPr>
+                        <a:t>chính</a:t>
+                      </a:r>
+                      <a:r>
+                        <a:rPr lang="en-US" sz="2000" dirty="0">
+                          <a:latin typeface="Times New Roman" panose="02020603050405020304" pitchFamily="18" charset="0"/>
+                          <a:cs typeface="Times New Roman" panose="02020603050405020304" pitchFamily="18" charset="0"/>
+                        </a:rPr>
+                        <a:t> </a:t>
+                      </a:r>
+                      <a:r>
+                        <a:rPr lang="en-US" sz="2000" dirty="0" err="1">
+                          <a:latin typeface="Times New Roman" panose="02020603050405020304" pitchFamily="18" charset="0"/>
+                          <a:cs typeface="Times New Roman" panose="02020603050405020304" pitchFamily="18" charset="0"/>
+                        </a:rPr>
+                        <a:t>xác</a:t>
+                      </a:r>
+                      <a:endParaRPr lang="en-US" sz="2000" dirty="0">
+                        <a:latin typeface="Times New Roman" panose="02020603050405020304" pitchFamily="18" charset="0"/>
+                        <a:cs typeface="Times New Roman" panose="02020603050405020304" pitchFamily="18" charset="0"/>
+                      </a:endParaRPr>
+                    </a:p>
+                  </a:txBody>
+                  <a:tcPr/>
+                </a:tc>
+                <a:tc hMerge="1">
+                  <a:txBody>
+                    <a:bodyPr/>
+                    <a:lstStyle/>
+                    <a:p>
+                      <a:endParaRPr lang="en-US" dirty="0"/>
+                    </a:p>
+                  </a:txBody>
+                  <a:tcPr/>
+                </a:tc>
+                <a:extLst>
+                  <a:ext uri="{0D108BD9-81ED-4DB2-BD59-A6C34878D82A}">
+                    <a16:rowId xmlns:a16="http://schemas.microsoft.com/office/drawing/2014/main" val="3428171097"/>
+                  </a:ext>
+                </a:extLst>
+              </a:tr>
+              <a:tr h="370840">
+                <a:tc vMerge="1">
+                  <a:txBody>
+                    <a:bodyPr/>
+                    <a:lstStyle/>
+                    <a:p>
+                      <a:endParaRPr lang="en-US" dirty="0"/>
+                    </a:p>
+                  </a:txBody>
+                  <a:tcPr/>
+                </a:tc>
+                <a:tc>
+                  <a:txBody>
+                    <a:bodyPr/>
+                    <a:lstStyle/>
+                    <a:p>
+                      <a:pPr algn="ctr"/>
+                      <a:r>
+                        <a:rPr lang="en-US" sz="2000" dirty="0">
+                          <a:latin typeface="Times New Roman" panose="02020603050405020304" pitchFamily="18" charset="0"/>
+                          <a:cs typeface="Times New Roman" panose="02020603050405020304" pitchFamily="18" charset="0"/>
+                        </a:rPr>
+                        <a:t>Trung </a:t>
+                      </a:r>
+                      <a:r>
+                        <a:rPr lang="en-US" sz="2000" dirty="0" err="1">
+                          <a:latin typeface="Times New Roman" panose="02020603050405020304" pitchFamily="18" charset="0"/>
+                          <a:cs typeface="Times New Roman" panose="02020603050405020304" pitchFamily="18" charset="0"/>
+                        </a:rPr>
+                        <a:t>bình</a:t>
+                      </a:r>
+                      <a:endParaRPr lang="en-US" sz="2000" dirty="0">
+                        <a:latin typeface="Times New Roman" panose="02020603050405020304" pitchFamily="18" charset="0"/>
+                        <a:cs typeface="Times New Roman" panose="02020603050405020304" pitchFamily="18" charset="0"/>
+                      </a:endParaRPr>
+                    </a:p>
+                  </a:txBody>
+                  <a:tcPr/>
+                </a:tc>
+                <a:tc>
+                  <a:txBody>
+                    <a:bodyPr/>
+                    <a:lstStyle/>
+                    <a:p>
+                      <a:pPr algn="ctr"/>
+                      <a:r>
+                        <a:rPr lang="en-US" sz="2000" dirty="0" err="1">
+                          <a:latin typeface="Times New Roman" panose="02020603050405020304" pitchFamily="18" charset="0"/>
+                          <a:cs typeface="Times New Roman" panose="02020603050405020304" pitchFamily="18" charset="0"/>
+                        </a:rPr>
+                        <a:t>Độ</a:t>
+                      </a:r>
+                      <a:r>
+                        <a:rPr lang="en-US" sz="2000" dirty="0">
+                          <a:latin typeface="Times New Roman" panose="02020603050405020304" pitchFamily="18" charset="0"/>
+                          <a:cs typeface="Times New Roman" panose="02020603050405020304" pitchFamily="18" charset="0"/>
+                        </a:rPr>
+                        <a:t> </a:t>
+                      </a:r>
+                      <a:r>
+                        <a:rPr lang="en-US" sz="2000" dirty="0" err="1">
+                          <a:latin typeface="Times New Roman" panose="02020603050405020304" pitchFamily="18" charset="0"/>
+                          <a:cs typeface="Times New Roman" panose="02020603050405020304" pitchFamily="18" charset="0"/>
+                        </a:rPr>
+                        <a:t>lệch</a:t>
+                      </a:r>
+                      <a:r>
+                        <a:rPr lang="en-US" sz="2000" dirty="0">
+                          <a:latin typeface="Times New Roman" panose="02020603050405020304" pitchFamily="18" charset="0"/>
+                          <a:cs typeface="Times New Roman" panose="02020603050405020304" pitchFamily="18" charset="0"/>
+                        </a:rPr>
+                        <a:t> </a:t>
+                      </a:r>
+                      <a:r>
+                        <a:rPr lang="en-US" sz="2000" dirty="0" err="1">
+                          <a:latin typeface="Times New Roman" panose="02020603050405020304" pitchFamily="18" charset="0"/>
+                          <a:cs typeface="Times New Roman" panose="02020603050405020304" pitchFamily="18" charset="0"/>
+                        </a:rPr>
+                        <a:t>chuẩn</a:t>
+                      </a:r>
+                      <a:endParaRPr lang="en-US" sz="2000" dirty="0">
+                        <a:latin typeface="Times New Roman" panose="02020603050405020304" pitchFamily="18" charset="0"/>
+                        <a:cs typeface="Times New Roman" panose="02020603050405020304" pitchFamily="18" charset="0"/>
+                      </a:endParaRPr>
+                    </a:p>
+                  </a:txBody>
+                  <a:tcPr/>
+                </a:tc>
+                <a:tc>
+                  <a:txBody>
+                    <a:bodyPr/>
+                    <a:lstStyle/>
+                    <a:p>
+                      <a:pPr algn="ctr"/>
+                      <a:r>
+                        <a:rPr lang="en-US" sz="2000" dirty="0">
+                          <a:latin typeface="Times New Roman" panose="02020603050405020304" pitchFamily="18" charset="0"/>
+                          <a:cs typeface="Times New Roman" panose="02020603050405020304" pitchFamily="18" charset="0"/>
+                        </a:rPr>
+                        <a:t>Trung </a:t>
+                      </a:r>
+                      <a:r>
+                        <a:rPr lang="en-US" sz="2000" dirty="0" err="1">
+                          <a:latin typeface="Times New Roman" panose="02020603050405020304" pitchFamily="18" charset="0"/>
+                          <a:cs typeface="Times New Roman" panose="02020603050405020304" pitchFamily="18" charset="0"/>
+                        </a:rPr>
+                        <a:t>bình</a:t>
+                      </a:r>
+                      <a:endParaRPr lang="en-US" sz="2000" dirty="0">
+                        <a:latin typeface="Times New Roman" panose="02020603050405020304" pitchFamily="18" charset="0"/>
+                        <a:cs typeface="Times New Roman" panose="02020603050405020304" pitchFamily="18" charset="0"/>
+                      </a:endParaRPr>
+                    </a:p>
+                  </a:txBody>
+                  <a:tcPr/>
+                </a:tc>
+                <a:tc>
+                  <a:txBody>
+                    <a:bodyPr/>
+                    <a:lstStyle/>
+                    <a:p>
+                      <a:pPr algn="ctr"/>
+                      <a:r>
+                        <a:rPr lang="en-US" sz="2000" dirty="0" err="1">
+                          <a:latin typeface="Times New Roman" panose="02020603050405020304" pitchFamily="18" charset="0"/>
+                          <a:cs typeface="Times New Roman" panose="02020603050405020304" pitchFamily="18" charset="0"/>
+                        </a:rPr>
+                        <a:t>Độ</a:t>
+                      </a:r>
+                      <a:r>
+                        <a:rPr lang="en-US" sz="2000" dirty="0">
+                          <a:latin typeface="Times New Roman" panose="02020603050405020304" pitchFamily="18" charset="0"/>
+                          <a:cs typeface="Times New Roman" panose="02020603050405020304" pitchFamily="18" charset="0"/>
+                        </a:rPr>
+                        <a:t> </a:t>
+                      </a:r>
+                      <a:r>
+                        <a:rPr lang="en-US" sz="2000" dirty="0" err="1">
+                          <a:latin typeface="Times New Roman" panose="02020603050405020304" pitchFamily="18" charset="0"/>
+                          <a:cs typeface="Times New Roman" panose="02020603050405020304" pitchFamily="18" charset="0"/>
+                        </a:rPr>
+                        <a:t>lệch</a:t>
+                      </a:r>
+                      <a:r>
+                        <a:rPr lang="en-US" sz="2000" dirty="0">
+                          <a:latin typeface="Times New Roman" panose="02020603050405020304" pitchFamily="18" charset="0"/>
+                          <a:cs typeface="Times New Roman" panose="02020603050405020304" pitchFamily="18" charset="0"/>
+                        </a:rPr>
+                        <a:t> </a:t>
+                      </a:r>
+                      <a:r>
+                        <a:rPr lang="en-US" sz="2000" dirty="0" err="1">
+                          <a:latin typeface="Times New Roman" panose="02020603050405020304" pitchFamily="18" charset="0"/>
+                          <a:cs typeface="Times New Roman" panose="02020603050405020304" pitchFamily="18" charset="0"/>
+                        </a:rPr>
+                        <a:t>chuẩn</a:t>
+                      </a:r>
+                      <a:endParaRPr lang="en-US" sz="2000" dirty="0">
+                        <a:latin typeface="Times New Roman" panose="02020603050405020304" pitchFamily="18" charset="0"/>
+                        <a:cs typeface="Times New Roman" panose="02020603050405020304" pitchFamily="18" charset="0"/>
+                      </a:endParaRPr>
+                    </a:p>
+                  </a:txBody>
+                  <a:tcPr/>
+                </a:tc>
+                <a:extLst>
+                  <a:ext uri="{0D108BD9-81ED-4DB2-BD59-A6C34878D82A}">
+                    <a16:rowId xmlns:a16="http://schemas.microsoft.com/office/drawing/2014/main" val="3745317419"/>
+                  </a:ext>
+                </a:extLst>
+              </a:tr>
+              <a:tr h="370840">
+                <a:tc>
+                  <a:txBody>
+                    <a:bodyPr/>
+                    <a:lstStyle/>
+                    <a:p>
+                      <a:pPr algn="ctr"/>
+                      <a:r>
+                        <a:rPr lang="en-US" sz="2000" dirty="0">
+                          <a:latin typeface="Times New Roman" panose="02020603050405020304" pitchFamily="18" charset="0"/>
+                          <a:cs typeface="Times New Roman" panose="02020603050405020304" pitchFamily="18" charset="0"/>
+                        </a:rPr>
+                        <a:t>2</a:t>
+                      </a:r>
+                    </a:p>
+                  </a:txBody>
+                  <a:tcPr/>
+                </a:tc>
+                <a:tc>
+                  <a:txBody>
+                    <a:bodyPr/>
+                    <a:lstStyle/>
+                    <a:p>
+                      <a:pPr algn="ctr"/>
+                      <a:r>
+                        <a:rPr lang="en-US" sz="2000" dirty="0">
+                          <a:latin typeface="Times New Roman" panose="02020603050405020304" pitchFamily="18" charset="0"/>
+                          <a:cs typeface="Times New Roman" panose="02020603050405020304" pitchFamily="18" charset="0"/>
+                        </a:rPr>
+                        <a:t>8.7667</a:t>
+                      </a:r>
+                    </a:p>
+                  </a:txBody>
+                  <a:tcPr/>
+                </a:tc>
+                <a:tc>
+                  <a:txBody>
+                    <a:bodyPr/>
+                    <a:lstStyle/>
+                    <a:p>
+                      <a:pPr algn="ctr"/>
+                      <a:r>
+                        <a:rPr lang="en-US" sz="2000" dirty="0">
+                          <a:latin typeface="Times New Roman" panose="02020603050405020304" pitchFamily="18" charset="0"/>
+                          <a:cs typeface="Times New Roman" panose="02020603050405020304" pitchFamily="18" charset="0"/>
+                        </a:rPr>
+                        <a:t>0.3278</a:t>
+                      </a:r>
+                    </a:p>
+                  </a:txBody>
+                  <a:tcPr/>
+                </a:tc>
+                <a:tc>
+                  <a:txBody>
+                    <a:bodyPr/>
+                    <a:lstStyle/>
+                    <a:p>
+                      <a:pPr algn="ctr"/>
+                      <a:r>
+                        <a:rPr lang="en-US" sz="2000" dirty="0">
+                          <a:latin typeface="Times New Roman" panose="02020603050405020304" pitchFamily="18" charset="0"/>
+                          <a:cs typeface="Times New Roman" panose="02020603050405020304" pitchFamily="18" charset="0"/>
+                        </a:rPr>
+                        <a:t>8.6583</a:t>
+                      </a:r>
+                    </a:p>
+                  </a:txBody>
+                  <a:tcPr/>
+                </a:tc>
+                <a:tc>
+                  <a:txBody>
+                    <a:bodyPr/>
+                    <a:lstStyle/>
+                    <a:p>
+                      <a:pPr algn="ctr"/>
+                      <a:r>
+                        <a:rPr lang="en-US" sz="2000" dirty="0">
+                          <a:latin typeface="Times New Roman" panose="02020603050405020304" pitchFamily="18" charset="0"/>
+                          <a:cs typeface="Times New Roman" panose="02020603050405020304" pitchFamily="18" charset="0"/>
+                        </a:rPr>
+                        <a:t>0.6581</a:t>
+                      </a:r>
+                    </a:p>
+                  </a:txBody>
+                  <a:tcPr/>
+                </a:tc>
+                <a:extLst>
+                  <a:ext uri="{0D108BD9-81ED-4DB2-BD59-A6C34878D82A}">
+                    <a16:rowId xmlns:a16="http://schemas.microsoft.com/office/drawing/2014/main" val="4203320636"/>
+                  </a:ext>
+                </a:extLst>
+              </a:tr>
+              <a:tr h="370840">
+                <a:tc>
+                  <a:txBody>
+                    <a:bodyPr/>
+                    <a:lstStyle/>
+                    <a:p>
+                      <a:pPr algn="ctr"/>
+                      <a:r>
+                        <a:rPr lang="en-US" sz="2000" dirty="0">
+                          <a:latin typeface="Times New Roman" panose="02020603050405020304" pitchFamily="18" charset="0"/>
+                          <a:cs typeface="Times New Roman" panose="02020603050405020304" pitchFamily="18" charset="0"/>
+                        </a:rPr>
+                        <a:t>5</a:t>
+                      </a:r>
+                    </a:p>
+                  </a:txBody>
+                  <a:tcPr/>
+                </a:tc>
+                <a:tc>
+                  <a:txBody>
+                    <a:bodyPr/>
+                    <a:lstStyle/>
+                    <a:p>
+                      <a:pPr algn="ctr"/>
+                      <a:r>
+                        <a:rPr lang="en-US" sz="2000" dirty="0">
+                          <a:latin typeface="Times New Roman" panose="02020603050405020304" pitchFamily="18" charset="0"/>
+                          <a:cs typeface="Times New Roman" panose="02020603050405020304" pitchFamily="18" charset="0"/>
+                        </a:rPr>
+                        <a:t>8.6917</a:t>
+                      </a:r>
+                    </a:p>
+                  </a:txBody>
+                  <a:tcPr/>
+                </a:tc>
+                <a:tc>
+                  <a:txBody>
+                    <a:bodyPr/>
+                    <a:lstStyle/>
+                    <a:p>
+                      <a:pPr algn="ctr"/>
+                      <a:r>
+                        <a:rPr lang="en-US" sz="2000" dirty="0">
+                          <a:latin typeface="Times New Roman" panose="02020603050405020304" pitchFamily="18" charset="0"/>
+                          <a:cs typeface="Times New Roman" panose="02020603050405020304" pitchFamily="18" charset="0"/>
+                        </a:rPr>
+                        <a:t>0.2516</a:t>
+                      </a:r>
+                    </a:p>
+                  </a:txBody>
+                  <a:tcPr/>
+                </a:tc>
+                <a:tc>
+                  <a:txBody>
+                    <a:bodyPr/>
+                    <a:lstStyle/>
+                    <a:p>
+                      <a:pPr algn="ctr"/>
+                      <a:r>
+                        <a:rPr lang="en-US" sz="2000" dirty="0">
+                          <a:latin typeface="Times New Roman" panose="02020603050405020304" pitchFamily="18" charset="0"/>
+                          <a:cs typeface="Times New Roman" panose="02020603050405020304" pitchFamily="18" charset="0"/>
+                        </a:rPr>
+                        <a:t>8.1833</a:t>
+                      </a:r>
+                    </a:p>
+                  </a:txBody>
+                  <a:tcPr/>
+                </a:tc>
+                <a:tc>
+                  <a:txBody>
+                    <a:bodyPr/>
+                    <a:lstStyle/>
+                    <a:p>
+                      <a:pPr algn="ctr"/>
+                      <a:r>
+                        <a:rPr lang="en-US" sz="2000" dirty="0">
+                          <a:latin typeface="Times New Roman" panose="02020603050405020304" pitchFamily="18" charset="0"/>
+                          <a:cs typeface="Times New Roman" panose="02020603050405020304" pitchFamily="18" charset="0"/>
+                        </a:rPr>
+                        <a:t>0.4777</a:t>
+                      </a:r>
+                    </a:p>
+                  </a:txBody>
+                  <a:tcPr/>
+                </a:tc>
+                <a:extLst>
+                  <a:ext uri="{0D108BD9-81ED-4DB2-BD59-A6C34878D82A}">
+                    <a16:rowId xmlns:a16="http://schemas.microsoft.com/office/drawing/2014/main" val="1383552061"/>
+                  </a:ext>
+                </a:extLst>
+              </a:tr>
+              <a:tr h="370840">
+                <a:tc>
+                  <a:txBody>
+                    <a:bodyPr/>
+                    <a:lstStyle/>
+                    <a:p>
+                      <a:pPr algn="ctr"/>
+                      <a:r>
+                        <a:rPr lang="en-US" sz="2000" dirty="0">
+                          <a:latin typeface="Times New Roman" panose="02020603050405020304" pitchFamily="18" charset="0"/>
+                          <a:cs typeface="Times New Roman" panose="02020603050405020304" pitchFamily="18" charset="0"/>
+                        </a:rPr>
+                        <a:t>10</a:t>
+                      </a:r>
+                    </a:p>
+                  </a:txBody>
+                  <a:tcPr/>
+                </a:tc>
+                <a:tc>
+                  <a:txBody>
+                    <a:bodyPr/>
+                    <a:lstStyle/>
+                    <a:p>
+                      <a:pPr algn="ctr"/>
+                      <a:r>
+                        <a:rPr lang="en-US" sz="2000" dirty="0">
+                          <a:latin typeface="Times New Roman" panose="02020603050405020304" pitchFamily="18" charset="0"/>
+                          <a:cs typeface="Times New Roman" panose="02020603050405020304" pitchFamily="18" charset="0"/>
+                        </a:rPr>
+                        <a:t>9.0167</a:t>
+                      </a:r>
+                    </a:p>
+                  </a:txBody>
+                  <a:tcPr/>
+                </a:tc>
+                <a:tc>
+                  <a:txBody>
+                    <a:bodyPr/>
+                    <a:lstStyle/>
+                    <a:p>
+                      <a:pPr algn="ctr"/>
+                      <a:r>
+                        <a:rPr lang="en-US" sz="2000" dirty="0">
+                          <a:latin typeface="Times New Roman" panose="02020603050405020304" pitchFamily="18" charset="0"/>
+                          <a:cs typeface="Times New Roman" panose="02020603050405020304" pitchFamily="18" charset="0"/>
+                        </a:rPr>
+                        <a:t>0.2702</a:t>
+                      </a:r>
+                    </a:p>
+                  </a:txBody>
+                  <a:tcPr/>
+                </a:tc>
+                <a:tc>
+                  <a:txBody>
+                    <a:bodyPr/>
+                    <a:lstStyle/>
+                    <a:p>
+                      <a:pPr algn="ctr"/>
+                      <a:r>
+                        <a:rPr lang="en-US" sz="2000" dirty="0">
+                          <a:latin typeface="Times New Roman" panose="02020603050405020304" pitchFamily="18" charset="0"/>
+                          <a:cs typeface="Times New Roman" panose="02020603050405020304" pitchFamily="18" charset="0"/>
+                        </a:rPr>
+                        <a:t>8.5667</a:t>
+                      </a:r>
+                    </a:p>
+                  </a:txBody>
+                  <a:tcPr/>
+                </a:tc>
+                <a:tc>
+                  <a:txBody>
+                    <a:bodyPr/>
+                    <a:lstStyle/>
+                    <a:p>
+                      <a:pPr algn="ctr"/>
+                      <a:r>
+                        <a:rPr lang="en-US" sz="2000" dirty="0">
+                          <a:latin typeface="Times New Roman" panose="02020603050405020304" pitchFamily="18" charset="0"/>
+                          <a:cs typeface="Times New Roman" panose="02020603050405020304" pitchFamily="18" charset="0"/>
+                        </a:rPr>
+                        <a:t>0.3212</a:t>
+                      </a:r>
+                    </a:p>
+                  </a:txBody>
+                  <a:tcPr/>
+                </a:tc>
+                <a:extLst>
+                  <a:ext uri="{0D108BD9-81ED-4DB2-BD59-A6C34878D82A}">
+                    <a16:rowId xmlns:a16="http://schemas.microsoft.com/office/drawing/2014/main" val="702600287"/>
+                  </a:ext>
+                </a:extLst>
+              </a:tr>
+            </a:tbl>
+          </a:graphicData>
+        </a:graphic>
+      </p:graphicFrame>
       <p:sp>
         <p:nvSpPr>
           <p:cNvPr id="4" name="Slide Number Placeholder 3">
@@ -17093,6 +17932,165 @@
               <a:t>33</a:t>
             </a:fld>
             <a:endParaRPr lang="vi-VN"/>
+          </a:p>
+        </p:txBody>
+      </p:sp>
+      <p:sp>
+        <p:nvSpPr>
+          <p:cNvPr id="7" name="Hộp Văn bản 6">
+            <a:extLst>
+              <a:ext uri="{FF2B5EF4-FFF2-40B4-BE49-F238E27FC236}">
+                <a16:creationId xmlns:a16="http://schemas.microsoft.com/office/drawing/2014/main" id="{E4DC019A-EAA4-CB7E-763E-BFE0A4F5AD91}"/>
+              </a:ext>
+            </a:extLst>
+          </p:cNvPr>
+          <p:cNvSpPr txBox="1"/>
+          <p:nvPr/>
+        </p:nvSpPr>
+        <p:spPr>
+          <a:xfrm>
+            <a:off x="838200" y="1323806"/>
+            <a:ext cx="1986280" cy="477054"/>
+          </a:xfrm>
+          <a:prstGeom prst="rect">
+            <a:avLst/>
+          </a:prstGeom>
+          <a:noFill/>
+        </p:spPr>
+        <p:txBody>
+          <a:bodyPr wrap="square" rtlCol="0">
+            <a:spAutoFit/>
+          </a:bodyPr>
+          <a:lstStyle/>
+          <a:p>
+            <a:pPr marL="285750" indent="-285750">
+              <a:buFont typeface="Arial" panose="020B0604020202020204" pitchFamily="34" charset="0"/>
+              <a:buChar char="•"/>
+            </a:pPr>
+            <a:r>
+              <a:rPr lang="en-US" sz="2500" b="1" dirty="0">
+                <a:latin typeface="Times New Roman" panose="02020603050405020304" pitchFamily="18" charset="0"/>
+                <a:cs typeface="Times New Roman" panose="02020603050405020304" pitchFamily="18" charset="0"/>
+              </a:rPr>
+              <a:t>Multi-turn</a:t>
+            </a:r>
+          </a:p>
+        </p:txBody>
+      </p:sp>
+      <p:sp>
+        <p:nvSpPr>
+          <p:cNvPr id="8" name="Hộp Văn bản 7">
+            <a:extLst>
+              <a:ext uri="{FF2B5EF4-FFF2-40B4-BE49-F238E27FC236}">
+                <a16:creationId xmlns:a16="http://schemas.microsoft.com/office/drawing/2014/main" id="{E28F8243-F062-4B01-9039-B376607BFC2C}"/>
+              </a:ext>
+            </a:extLst>
+          </p:cNvPr>
+          <p:cNvSpPr txBox="1"/>
+          <p:nvPr/>
+        </p:nvSpPr>
+        <p:spPr>
+          <a:xfrm>
+            <a:off x="838200" y="4355424"/>
+            <a:ext cx="4373880" cy="1092607"/>
+          </a:xfrm>
+          <a:prstGeom prst="rect">
+            <a:avLst/>
+          </a:prstGeom>
+          <a:noFill/>
+        </p:spPr>
+        <p:txBody>
+          <a:bodyPr wrap="square" rtlCol="0">
+            <a:spAutoFit/>
+          </a:bodyPr>
+          <a:lstStyle/>
+          <a:p>
+            <a:pPr marL="285750" indent="-285750">
+              <a:buFont typeface="Arial" panose="020B0604020202020204" pitchFamily="34" charset="0"/>
+              <a:buChar char="•"/>
+            </a:pPr>
+            <a:r>
+              <a:rPr lang="en-US" sz="2500" b="1" dirty="0">
+                <a:latin typeface="Times New Roman" panose="02020603050405020304" pitchFamily="18" charset="0"/>
+                <a:cs typeface="Times New Roman" panose="02020603050405020304" pitchFamily="18" charset="0"/>
+              </a:rPr>
+              <a:t>One-shot</a:t>
+            </a:r>
+          </a:p>
+          <a:p>
+            <a:pPr marL="342900" indent="-342900">
+              <a:buFontTx/>
+              <a:buChar char="-"/>
+            </a:pPr>
+            <a:r>
+              <a:rPr lang="en-US" sz="2000" dirty="0">
+                <a:latin typeface="Times New Roman" panose="02020603050405020304" pitchFamily="18" charset="0"/>
+                <a:cs typeface="Times New Roman" panose="02020603050405020304" pitchFamily="18" charset="0"/>
+              </a:rPr>
+              <a:t>Trung </a:t>
+            </a:r>
+            <a:r>
+              <a:rPr lang="en-US" sz="2000" dirty="0" err="1">
+                <a:latin typeface="Times New Roman" panose="02020603050405020304" pitchFamily="18" charset="0"/>
+                <a:cs typeface="Times New Roman" panose="02020603050405020304" pitchFamily="18" charset="0"/>
+              </a:rPr>
+              <a:t>bình</a:t>
+            </a:r>
+            <a:r>
+              <a:rPr lang="en-US" sz="2000" dirty="0">
+                <a:latin typeface="Times New Roman" panose="02020603050405020304" pitchFamily="18" charset="0"/>
+                <a:cs typeface="Times New Roman" panose="02020603050405020304" pitchFamily="18" charset="0"/>
+              </a:rPr>
+              <a:t>: 7.6825</a:t>
+            </a:r>
+          </a:p>
+          <a:p>
+            <a:pPr marL="342900" indent="-342900">
+              <a:buFontTx/>
+              <a:buChar char="-"/>
+            </a:pPr>
+            <a:r>
+              <a:rPr lang="en-US" sz="2000" dirty="0" err="1">
+                <a:latin typeface="Times New Roman" panose="02020603050405020304" pitchFamily="18" charset="0"/>
+                <a:cs typeface="Times New Roman" panose="02020603050405020304" pitchFamily="18" charset="0"/>
+              </a:rPr>
+              <a:t>Độ</a:t>
+            </a:r>
+            <a:r>
+              <a:rPr lang="en-US" sz="2000" dirty="0">
+                <a:latin typeface="Times New Roman" panose="02020603050405020304" pitchFamily="18" charset="0"/>
+                <a:cs typeface="Times New Roman" panose="02020603050405020304" pitchFamily="18" charset="0"/>
+              </a:rPr>
+              <a:t> </a:t>
+            </a:r>
+            <a:r>
+              <a:rPr lang="en-US" sz="2000" dirty="0" err="1">
+                <a:latin typeface="Times New Roman" panose="02020603050405020304" pitchFamily="18" charset="0"/>
+                <a:cs typeface="Times New Roman" panose="02020603050405020304" pitchFamily="18" charset="0"/>
+              </a:rPr>
+              <a:t>lệch</a:t>
+            </a:r>
+            <a:r>
+              <a:rPr lang="en-US" sz="2000" dirty="0">
+                <a:latin typeface="Times New Roman" panose="02020603050405020304" pitchFamily="18" charset="0"/>
+                <a:cs typeface="Times New Roman" panose="02020603050405020304" pitchFamily="18" charset="0"/>
+              </a:rPr>
+              <a:t> </a:t>
+            </a:r>
+            <a:r>
+              <a:rPr lang="en-US" sz="2000" dirty="0" err="1">
+                <a:latin typeface="Times New Roman" panose="02020603050405020304" pitchFamily="18" charset="0"/>
+                <a:cs typeface="Times New Roman" panose="02020603050405020304" pitchFamily="18" charset="0"/>
+              </a:rPr>
+              <a:t>chuẩn</a:t>
+            </a:r>
+            <a:r>
+              <a:rPr lang="en-US" sz="2000" dirty="0">
+                <a:latin typeface="Times New Roman" panose="02020603050405020304" pitchFamily="18" charset="0"/>
+                <a:cs typeface="Times New Roman" panose="02020603050405020304" pitchFamily="18" charset="0"/>
+              </a:rPr>
+              <a:t>: 0.7478</a:t>
+            </a:r>
           </a:p>
         </p:txBody>
       </p:sp>
@@ -17118,6 +18116,165 @@
       </p:transition>
     </mc:Fallback>
   </mc:AlternateContent>
+  <p:timing>
+    <p:tnLst>
+      <p:par>
+        <p:cTn id="1" dur="indefinite" restart="never" nodeType="tmRoot">
+          <p:childTnLst>
+            <p:seq concurrent="1" nextAc="seek">
+              <p:cTn id="2" dur="indefinite" nodeType="mainSeq">
+                <p:childTnLst>
+                  <p:par>
+                    <p:cTn id="3" fill="hold">
+                      <p:stCondLst>
+                        <p:cond delay="indefinite"/>
+                      </p:stCondLst>
+                      <p:childTnLst>
+                        <p:par>
+                          <p:cTn id="4" fill="hold">
+                            <p:stCondLst>
+                              <p:cond delay="0"/>
+                            </p:stCondLst>
+                            <p:childTnLst>
+                              <p:par>
+                                <p:cTn id="5" presetID="1" presetClass="entr" presetSubtype="0" fill="hold" grpId="0" nodeType="clickEffect">
+                                  <p:stCondLst>
+                                    <p:cond delay="0"/>
+                                  </p:stCondLst>
+                                  <p:childTnLst>
+                                    <p:set>
+                                      <p:cBhvr>
+                                        <p:cTn id="6" dur="1" fill="hold">
+                                          <p:stCondLst>
+                                            <p:cond delay="0"/>
+                                          </p:stCondLst>
+                                        </p:cTn>
+                                        <p:tgtEl>
+                                          <p:spTgt spid="7"/>
+                                        </p:tgtEl>
+                                        <p:attrNameLst>
+                                          <p:attrName>style.visibility</p:attrName>
+                                        </p:attrNameLst>
+                                      </p:cBhvr>
+                                      <p:to>
+                                        <p:strVal val="visible"/>
+                                      </p:to>
+                                    </p:set>
+                                  </p:childTnLst>
+                                </p:cTn>
+                              </p:par>
+                              <p:par>
+                                <p:cTn id="7" presetID="10" presetClass="entr" presetSubtype="0" fill="hold" nodeType="withEffect">
+                                  <p:stCondLst>
+                                    <p:cond delay="0"/>
+                                  </p:stCondLst>
+                                  <p:childTnLst>
+                                    <p:set>
+                                      <p:cBhvr>
+                                        <p:cTn id="8" dur="1" fill="hold">
+                                          <p:stCondLst>
+                                            <p:cond delay="0"/>
+                                          </p:stCondLst>
+                                        </p:cTn>
+                                        <p:tgtEl>
+                                          <p:spTgt spid="6"/>
+                                        </p:tgtEl>
+                                        <p:attrNameLst>
+                                          <p:attrName>style.visibility</p:attrName>
+                                        </p:attrNameLst>
+                                      </p:cBhvr>
+                                      <p:to>
+                                        <p:strVal val="visible"/>
+                                      </p:to>
+                                    </p:set>
+                                    <p:animEffect transition="in" filter="fade">
+                                      <p:cBhvr>
+                                        <p:cTn id="9" dur="500"/>
+                                        <p:tgtEl>
+                                          <p:spTgt spid="6"/>
+                                        </p:tgtEl>
+                                      </p:cBhvr>
+                                    </p:animEffect>
+                                  </p:childTnLst>
+                                </p:cTn>
+                              </p:par>
+                            </p:childTnLst>
+                          </p:cTn>
+                        </p:par>
+                      </p:childTnLst>
+                    </p:cTn>
+                  </p:par>
+                  <p:par>
+                    <p:cTn id="10" fill="hold">
+                      <p:stCondLst>
+                        <p:cond delay="indefinite"/>
+                      </p:stCondLst>
+                      <p:childTnLst>
+                        <p:par>
+                          <p:cTn id="11" fill="hold">
+                            <p:stCondLst>
+                              <p:cond delay="0"/>
+                            </p:stCondLst>
+                            <p:childTnLst>
+                              <p:par>
+                                <p:cTn id="12" presetID="1" presetClass="entr" presetSubtype="0" fill="hold" grpId="0" nodeType="clickEffect">
+                                  <p:stCondLst>
+                                    <p:cond delay="0"/>
+                                  </p:stCondLst>
+                                  <p:childTnLst>
+                                    <p:set>
+                                      <p:cBhvr>
+                                        <p:cTn id="13" dur="1" fill="hold">
+                                          <p:stCondLst>
+                                            <p:cond delay="0"/>
+                                          </p:stCondLst>
+                                        </p:cTn>
+                                        <p:tgtEl>
+                                          <p:spTgt spid="8"/>
+                                        </p:tgtEl>
+                                        <p:attrNameLst>
+                                          <p:attrName>style.visibility</p:attrName>
+                                        </p:attrNameLst>
+                                      </p:cBhvr>
+                                      <p:to>
+                                        <p:strVal val="visible"/>
+                                      </p:to>
+                                    </p:set>
+                                  </p:childTnLst>
+                                </p:cTn>
+                              </p:par>
+                            </p:childTnLst>
+                          </p:cTn>
+                        </p:par>
+                      </p:childTnLst>
+                    </p:cTn>
+                  </p:par>
+                </p:childTnLst>
+              </p:cTn>
+              <p:prevCondLst>
+                <p:cond evt="onPrev" delay="0">
+                  <p:tgtEl>
+                    <p:sldTgt/>
+                  </p:tgtEl>
+                </p:cond>
+              </p:prevCondLst>
+              <p:nextCondLst>
+                <p:cond evt="onNext" delay="0">
+                  <p:tgtEl>
+                    <p:sldTgt/>
+                  </p:tgtEl>
+                </p:cond>
+              </p:nextCondLst>
+            </p:seq>
+          </p:childTnLst>
+        </p:cTn>
+      </p:par>
+    </p:tnLst>
+    <p:bldLst>
+      <p:bldP spid="7" grpId="0"/>
+      <p:bldP spid="8" grpId="0"/>
+    </p:bldLst>
+  </p:timing>
 </p:sld>
 </file>
 

</xml_diff>